<commit_message>
Curso de Git & GitHub » Aula 07 - Comandos básicos do git
</commit_message>
<xml_diff>
--- a/Curso de Git & GitHub/Apresentações/Power Point/Curso de Git & GitHub » Aula 05 - Comandos básicos do terminal.pptx
+++ b/Curso de Git & GitHub/Apresentações/Power Point/Curso de Git & GitHub » Aula 05 - Comandos básicos do terminal.pptx
@@ -220,7 +220,7 @@
           <a:p>
             <a:fld id="{9B10D6CF-6099-4B27-AAA5-4A24AACA45B1}" type="datetimeFigureOut">
               <a:rPr lang="pt-BR" smtClean="0"/>
-              <a:t>02/01/2021</a:t>
+              <a:t>16/02/2021</a:t>
             </a:fld>
             <a:endParaRPr lang="pt-BR" dirty="0"/>
           </a:p>
@@ -385,7 +385,7 @@
           <a:p>
             <a:fld id="{30CA822D-E58E-41A4-839D-F5BF7D683320}" type="datetimeFigureOut">
               <a:rPr lang="pt-BR" smtClean="0"/>
-              <a:t>02/01/2021</a:t>
+              <a:t>16/02/2021</a:t>
             </a:fld>
             <a:endParaRPr lang="pt-BR" dirty="0"/>
           </a:p>
@@ -449,38 +449,37 @@
           <a:p>
             <a:pPr lvl="0"/>
             <a:r>
-              <a:rPr lang="pt-BR" smtClean="0"/>
+              <a:rPr lang="pt-BR"/>
               <a:t>Clique para editar o texto mestre</a:t>
             </a:r>
           </a:p>
           <a:p>
             <a:pPr lvl="1"/>
             <a:r>
-              <a:rPr lang="pt-BR" smtClean="0"/>
+              <a:rPr lang="pt-BR"/>
               <a:t>Segundo nível</a:t>
             </a:r>
           </a:p>
           <a:p>
             <a:pPr lvl="2"/>
             <a:r>
-              <a:rPr lang="pt-BR" smtClean="0"/>
+              <a:rPr lang="pt-BR"/>
               <a:t>Terceiro nível</a:t>
             </a:r>
           </a:p>
           <a:p>
             <a:pPr lvl="3"/>
             <a:r>
-              <a:rPr lang="pt-BR" smtClean="0"/>
+              <a:rPr lang="pt-BR"/>
               <a:t>Quarto nível</a:t>
             </a:r>
           </a:p>
           <a:p>
             <a:pPr lvl="4"/>
             <a:r>
-              <a:rPr lang="pt-BR" smtClean="0"/>
+              <a:rPr lang="pt-BR"/>
               <a:t>Quinto nível</a:t>
             </a:r>
-            <a:endParaRPr lang="pt-BR"/>
           </a:p>
         </p:txBody>
       </p:sp>
@@ -698,7 +697,7 @@
           <a:lstStyle/>
           <a:p>
             <a:r>
-              <a:rPr lang="pt-PT" dirty="0" smtClean="0"/>
+              <a:rPr lang="pt-PT" dirty="0"/>
               <a:t>Layout criado para os meus slides no YouTube</a:t>
             </a:r>
           </a:p>
@@ -785,7 +784,7 @@
           <a:lstStyle/>
           <a:p>
             <a:r>
-              <a:rPr lang="pt-PT" dirty="0" smtClean="0"/>
+              <a:rPr lang="pt-PT" dirty="0"/>
               <a:t>Layout criado para os meus slides no YouTube</a:t>
             </a:r>
           </a:p>
@@ -869,7 +868,7 @@
           </a:lstStyle>
           <a:p>
             <a:r>
-              <a:rPr lang="pt-BR" smtClean="0"/>
+              <a:rPr lang="pt-BR"/>
               <a:t>Clique para editar o título mestre</a:t>
             </a:r>
             <a:endParaRPr lang="en-US" dirty="0"/>
@@ -934,7 +933,7 @@
           </a:lstStyle>
           <a:p>
             <a:r>
-              <a:rPr lang="pt-BR" smtClean="0"/>
+              <a:rPr lang="pt-BR"/>
               <a:t>Clique para editar o estilo do subtítulo mestre</a:t>
             </a:r>
             <a:endParaRPr lang="en-US" dirty="0"/>
@@ -958,7 +957,7 @@
           <a:p>
             <a:fld id="{F72AEF3B-AD3D-4C07-B255-57037BF73F56}" type="datetimeFigureOut">
               <a:rPr lang="pt-BR" smtClean="0"/>
-              <a:t>02/01/2021</a:t>
+              <a:t>16/02/2021</a:t>
             </a:fld>
             <a:endParaRPr lang="pt-BR" dirty="0"/>
           </a:p>
@@ -1052,7 +1051,7 @@
           <a:lstStyle/>
           <a:p>
             <a:r>
-              <a:rPr lang="pt-BR" smtClean="0"/>
+              <a:rPr lang="pt-BR"/>
               <a:t>Clique para editar o título mestre</a:t>
             </a:r>
             <a:endParaRPr lang="en-US" dirty="0"/>
@@ -1076,35 +1075,35 @@
           <a:p>
             <a:pPr lvl="0"/>
             <a:r>
-              <a:rPr lang="pt-BR" smtClean="0"/>
+              <a:rPr lang="pt-BR"/>
               <a:t>Clique para editar o texto mestre</a:t>
             </a:r>
           </a:p>
           <a:p>
             <a:pPr lvl="1"/>
             <a:r>
-              <a:rPr lang="pt-BR" smtClean="0"/>
+              <a:rPr lang="pt-BR"/>
               <a:t>Segundo nível</a:t>
             </a:r>
           </a:p>
           <a:p>
             <a:pPr lvl="2"/>
             <a:r>
-              <a:rPr lang="pt-BR" smtClean="0"/>
+              <a:rPr lang="pt-BR"/>
               <a:t>Terceiro nível</a:t>
             </a:r>
           </a:p>
           <a:p>
             <a:pPr lvl="3"/>
             <a:r>
-              <a:rPr lang="pt-BR" smtClean="0"/>
+              <a:rPr lang="pt-BR"/>
               <a:t>Quarto nível</a:t>
             </a:r>
           </a:p>
           <a:p>
             <a:pPr lvl="4"/>
             <a:r>
-              <a:rPr lang="pt-BR" smtClean="0"/>
+              <a:rPr lang="pt-BR"/>
               <a:t>Quinto nível</a:t>
             </a:r>
             <a:endParaRPr lang="en-US" dirty="0"/>
@@ -1128,7 +1127,7 @@
           <a:p>
             <a:fld id="{F72AEF3B-AD3D-4C07-B255-57037BF73F56}" type="datetimeFigureOut">
               <a:rPr lang="pt-BR" smtClean="0"/>
-              <a:t>02/01/2021</a:t>
+              <a:t>16/02/2021</a:t>
             </a:fld>
             <a:endParaRPr lang="pt-BR" dirty="0"/>
           </a:p>
@@ -1227,7 +1226,7 @@
           <a:lstStyle/>
           <a:p>
             <a:r>
-              <a:rPr lang="pt-BR" smtClean="0"/>
+              <a:rPr lang="pt-BR"/>
               <a:t>Clique para editar o título mestre</a:t>
             </a:r>
             <a:endParaRPr lang="en-US" dirty="0"/>
@@ -1256,35 +1255,35 @@
           <a:p>
             <a:pPr lvl="0"/>
             <a:r>
-              <a:rPr lang="pt-BR" smtClean="0"/>
+              <a:rPr lang="pt-BR"/>
               <a:t>Clique para editar o texto mestre</a:t>
             </a:r>
           </a:p>
           <a:p>
             <a:pPr lvl="1"/>
             <a:r>
-              <a:rPr lang="pt-BR" smtClean="0"/>
+              <a:rPr lang="pt-BR"/>
               <a:t>Segundo nível</a:t>
             </a:r>
           </a:p>
           <a:p>
             <a:pPr lvl="2"/>
             <a:r>
-              <a:rPr lang="pt-BR" smtClean="0"/>
+              <a:rPr lang="pt-BR"/>
               <a:t>Terceiro nível</a:t>
             </a:r>
           </a:p>
           <a:p>
             <a:pPr lvl="3"/>
             <a:r>
-              <a:rPr lang="pt-BR" smtClean="0"/>
+              <a:rPr lang="pt-BR"/>
               <a:t>Quarto nível</a:t>
             </a:r>
           </a:p>
           <a:p>
             <a:pPr lvl="4"/>
             <a:r>
-              <a:rPr lang="pt-BR" smtClean="0"/>
+              <a:rPr lang="pt-BR"/>
               <a:t>Quinto nível</a:t>
             </a:r>
             <a:endParaRPr lang="en-US" dirty="0"/>
@@ -1308,7 +1307,7 @@
           <a:p>
             <a:fld id="{F72AEF3B-AD3D-4C07-B255-57037BF73F56}" type="datetimeFigureOut">
               <a:rPr lang="pt-BR" smtClean="0"/>
-              <a:t>02/01/2021</a:t>
+              <a:t>16/02/2021</a:t>
             </a:fld>
             <a:endParaRPr lang="pt-BR" dirty="0"/>
           </a:p>
@@ -1402,7 +1401,7 @@
           <a:lstStyle/>
           <a:p>
             <a:r>
-              <a:rPr lang="pt-BR" smtClean="0"/>
+              <a:rPr lang="pt-BR"/>
               <a:t>Clique para editar o título mestre</a:t>
             </a:r>
             <a:endParaRPr lang="en-US" dirty="0"/>
@@ -1426,35 +1425,35 @@
           <a:p>
             <a:pPr lvl="0"/>
             <a:r>
-              <a:rPr lang="pt-BR" smtClean="0"/>
+              <a:rPr lang="pt-BR"/>
               <a:t>Clique para editar o texto mestre</a:t>
             </a:r>
           </a:p>
           <a:p>
             <a:pPr lvl="1"/>
             <a:r>
-              <a:rPr lang="pt-BR" smtClean="0"/>
+              <a:rPr lang="pt-BR"/>
               <a:t>Segundo nível</a:t>
             </a:r>
           </a:p>
           <a:p>
             <a:pPr lvl="2"/>
             <a:r>
-              <a:rPr lang="pt-BR" smtClean="0"/>
+              <a:rPr lang="pt-BR"/>
               <a:t>Terceiro nível</a:t>
             </a:r>
           </a:p>
           <a:p>
             <a:pPr lvl="3"/>
             <a:r>
-              <a:rPr lang="pt-BR" smtClean="0"/>
+              <a:rPr lang="pt-BR"/>
               <a:t>Quarto nível</a:t>
             </a:r>
           </a:p>
           <a:p>
             <a:pPr lvl="4"/>
             <a:r>
-              <a:rPr lang="pt-BR" smtClean="0"/>
+              <a:rPr lang="pt-BR"/>
               <a:t>Quinto nível</a:t>
             </a:r>
             <a:endParaRPr lang="en-US" dirty="0"/>
@@ -1478,7 +1477,7 @@
           <a:p>
             <a:fld id="{F72AEF3B-AD3D-4C07-B255-57037BF73F56}" type="datetimeFigureOut">
               <a:rPr lang="pt-BR" smtClean="0"/>
-              <a:t>02/01/2021</a:t>
+              <a:t>16/02/2021</a:t>
             </a:fld>
             <a:endParaRPr lang="pt-BR" dirty="0"/>
           </a:p>
@@ -1581,7 +1580,7 @@
           </a:lstStyle>
           <a:p>
             <a:r>
-              <a:rPr lang="pt-BR" smtClean="0"/>
+              <a:rPr lang="pt-BR"/>
               <a:t>Clique para editar o título mestre</a:t>
             </a:r>
             <a:endParaRPr lang="en-US" dirty="0"/>
@@ -1701,7 +1700,7 @@
           <a:p>
             <a:pPr lvl="0"/>
             <a:r>
-              <a:rPr lang="pt-BR" smtClean="0"/>
+              <a:rPr lang="pt-BR"/>
               <a:t>Clique para editar o texto mestre</a:t>
             </a:r>
           </a:p>
@@ -1724,7 +1723,7 @@
           <a:p>
             <a:fld id="{F72AEF3B-AD3D-4C07-B255-57037BF73F56}" type="datetimeFigureOut">
               <a:rPr lang="pt-BR" smtClean="0"/>
-              <a:t>02/01/2021</a:t>
+              <a:t>16/02/2021</a:t>
             </a:fld>
             <a:endParaRPr lang="pt-BR" dirty="0"/>
           </a:p>
@@ -1818,7 +1817,7 @@
           <a:lstStyle/>
           <a:p>
             <a:r>
-              <a:rPr lang="pt-BR" smtClean="0"/>
+              <a:rPr lang="pt-BR"/>
               <a:t>Clique para editar o título mestre</a:t>
             </a:r>
             <a:endParaRPr lang="en-US" dirty="0"/>
@@ -1847,35 +1846,35 @@
           <a:p>
             <a:pPr lvl="0"/>
             <a:r>
-              <a:rPr lang="pt-BR" smtClean="0"/>
+              <a:rPr lang="pt-BR"/>
               <a:t>Clique para editar o texto mestre</a:t>
             </a:r>
           </a:p>
           <a:p>
             <a:pPr lvl="1"/>
             <a:r>
-              <a:rPr lang="pt-BR" smtClean="0"/>
+              <a:rPr lang="pt-BR"/>
               <a:t>Segundo nível</a:t>
             </a:r>
           </a:p>
           <a:p>
             <a:pPr lvl="2"/>
             <a:r>
-              <a:rPr lang="pt-BR" smtClean="0"/>
+              <a:rPr lang="pt-BR"/>
               <a:t>Terceiro nível</a:t>
             </a:r>
           </a:p>
           <a:p>
             <a:pPr lvl="3"/>
             <a:r>
-              <a:rPr lang="pt-BR" smtClean="0"/>
+              <a:rPr lang="pt-BR"/>
               <a:t>Quarto nível</a:t>
             </a:r>
           </a:p>
           <a:p>
             <a:pPr lvl="4"/>
             <a:r>
-              <a:rPr lang="pt-BR" smtClean="0"/>
+              <a:rPr lang="pt-BR"/>
               <a:t>Quinto nível</a:t>
             </a:r>
             <a:endParaRPr lang="en-US" dirty="0"/>
@@ -1904,35 +1903,35 @@
           <a:p>
             <a:pPr lvl="0"/>
             <a:r>
-              <a:rPr lang="pt-BR" smtClean="0"/>
+              <a:rPr lang="pt-BR"/>
               <a:t>Clique para editar o texto mestre</a:t>
             </a:r>
           </a:p>
           <a:p>
             <a:pPr lvl="1"/>
             <a:r>
-              <a:rPr lang="pt-BR" smtClean="0"/>
+              <a:rPr lang="pt-BR"/>
               <a:t>Segundo nível</a:t>
             </a:r>
           </a:p>
           <a:p>
             <a:pPr lvl="2"/>
             <a:r>
-              <a:rPr lang="pt-BR" smtClean="0"/>
+              <a:rPr lang="pt-BR"/>
               <a:t>Terceiro nível</a:t>
             </a:r>
           </a:p>
           <a:p>
             <a:pPr lvl="3"/>
             <a:r>
-              <a:rPr lang="pt-BR" smtClean="0"/>
+              <a:rPr lang="pt-BR"/>
               <a:t>Quarto nível</a:t>
             </a:r>
           </a:p>
           <a:p>
             <a:pPr lvl="4"/>
             <a:r>
-              <a:rPr lang="pt-BR" smtClean="0"/>
+              <a:rPr lang="pt-BR"/>
               <a:t>Quinto nível</a:t>
             </a:r>
             <a:endParaRPr lang="en-US" dirty="0"/>
@@ -1956,7 +1955,7 @@
           <a:p>
             <a:fld id="{F72AEF3B-AD3D-4C07-B255-57037BF73F56}" type="datetimeFigureOut">
               <a:rPr lang="pt-BR" smtClean="0"/>
-              <a:t>02/01/2021</a:t>
+              <a:t>16/02/2021</a:t>
             </a:fld>
             <a:endParaRPr lang="pt-BR" dirty="0"/>
           </a:p>
@@ -2055,7 +2054,7 @@
           <a:lstStyle/>
           <a:p>
             <a:r>
-              <a:rPr lang="pt-BR" smtClean="0"/>
+              <a:rPr lang="pt-BR"/>
               <a:t>Clique para editar o título mestre</a:t>
             </a:r>
             <a:endParaRPr lang="en-US" dirty="0"/>
@@ -2121,7 +2120,7 @@
           <a:p>
             <a:pPr lvl="0"/>
             <a:r>
-              <a:rPr lang="pt-BR" smtClean="0"/>
+              <a:rPr lang="pt-BR"/>
               <a:t>Clique para editar o texto mestre</a:t>
             </a:r>
           </a:p>
@@ -2149,35 +2148,35 @@
           <a:p>
             <a:pPr lvl="0"/>
             <a:r>
-              <a:rPr lang="pt-BR" smtClean="0"/>
+              <a:rPr lang="pt-BR"/>
               <a:t>Clique para editar o texto mestre</a:t>
             </a:r>
           </a:p>
           <a:p>
             <a:pPr lvl="1"/>
             <a:r>
-              <a:rPr lang="pt-BR" smtClean="0"/>
+              <a:rPr lang="pt-BR"/>
               <a:t>Segundo nível</a:t>
             </a:r>
           </a:p>
           <a:p>
             <a:pPr lvl="2"/>
             <a:r>
-              <a:rPr lang="pt-BR" smtClean="0"/>
+              <a:rPr lang="pt-BR"/>
               <a:t>Terceiro nível</a:t>
             </a:r>
           </a:p>
           <a:p>
             <a:pPr lvl="3"/>
             <a:r>
-              <a:rPr lang="pt-BR" smtClean="0"/>
+              <a:rPr lang="pt-BR"/>
               <a:t>Quarto nível</a:t>
             </a:r>
           </a:p>
           <a:p>
             <a:pPr lvl="4"/>
             <a:r>
-              <a:rPr lang="pt-BR" smtClean="0"/>
+              <a:rPr lang="pt-BR"/>
               <a:t>Quinto nível</a:t>
             </a:r>
             <a:endParaRPr lang="en-US" dirty="0"/>
@@ -2243,7 +2242,7 @@
           <a:p>
             <a:pPr lvl="0"/>
             <a:r>
-              <a:rPr lang="pt-BR" smtClean="0"/>
+              <a:rPr lang="pt-BR"/>
               <a:t>Clique para editar o texto mestre</a:t>
             </a:r>
           </a:p>
@@ -2271,35 +2270,35 @@
           <a:p>
             <a:pPr lvl="0"/>
             <a:r>
-              <a:rPr lang="pt-BR" smtClean="0"/>
+              <a:rPr lang="pt-BR"/>
               <a:t>Clique para editar o texto mestre</a:t>
             </a:r>
           </a:p>
           <a:p>
             <a:pPr lvl="1"/>
             <a:r>
-              <a:rPr lang="pt-BR" smtClean="0"/>
+              <a:rPr lang="pt-BR"/>
               <a:t>Segundo nível</a:t>
             </a:r>
           </a:p>
           <a:p>
             <a:pPr lvl="2"/>
             <a:r>
-              <a:rPr lang="pt-BR" smtClean="0"/>
+              <a:rPr lang="pt-BR"/>
               <a:t>Terceiro nível</a:t>
             </a:r>
           </a:p>
           <a:p>
             <a:pPr lvl="3"/>
             <a:r>
-              <a:rPr lang="pt-BR" smtClean="0"/>
+              <a:rPr lang="pt-BR"/>
               <a:t>Quarto nível</a:t>
             </a:r>
           </a:p>
           <a:p>
             <a:pPr lvl="4"/>
             <a:r>
-              <a:rPr lang="pt-BR" smtClean="0"/>
+              <a:rPr lang="pt-BR"/>
               <a:t>Quinto nível</a:t>
             </a:r>
             <a:endParaRPr lang="en-US" dirty="0"/>
@@ -2323,7 +2322,7 @@
           <a:p>
             <a:fld id="{F72AEF3B-AD3D-4C07-B255-57037BF73F56}" type="datetimeFigureOut">
               <a:rPr lang="pt-BR" smtClean="0"/>
-              <a:t>02/01/2021</a:t>
+              <a:t>16/02/2021</a:t>
             </a:fld>
             <a:endParaRPr lang="pt-BR" dirty="0"/>
           </a:p>
@@ -2417,7 +2416,7 @@
           <a:lstStyle/>
           <a:p>
             <a:r>
-              <a:rPr lang="pt-BR" smtClean="0"/>
+              <a:rPr lang="pt-BR"/>
               <a:t>Clique para editar o título mestre</a:t>
             </a:r>
             <a:endParaRPr lang="en-US" dirty="0"/>
@@ -2441,7 +2440,7 @@
           <a:p>
             <a:fld id="{F72AEF3B-AD3D-4C07-B255-57037BF73F56}" type="datetimeFigureOut">
               <a:rPr lang="pt-BR" smtClean="0"/>
-              <a:t>02/01/2021</a:t>
+              <a:t>16/02/2021</a:t>
             </a:fld>
             <a:endParaRPr lang="pt-BR" dirty="0"/>
           </a:p>
@@ -2536,7 +2535,7 @@
           <a:p>
             <a:fld id="{F72AEF3B-AD3D-4C07-B255-57037BF73F56}" type="datetimeFigureOut">
               <a:rPr lang="pt-BR" smtClean="0"/>
-              <a:t>02/01/2021</a:t>
+              <a:t>16/02/2021</a:t>
             </a:fld>
             <a:endParaRPr lang="pt-BR" dirty="0"/>
           </a:p>
@@ -2639,7 +2638,7 @@
           </a:lstStyle>
           <a:p>
             <a:r>
-              <a:rPr lang="pt-BR" smtClean="0"/>
+              <a:rPr lang="pt-BR"/>
               <a:t>Clique para editar o título mestre</a:t>
             </a:r>
             <a:endParaRPr lang="en-US" dirty="0"/>
@@ -2696,35 +2695,35 @@
           <a:p>
             <a:pPr lvl="0"/>
             <a:r>
-              <a:rPr lang="pt-BR" smtClean="0"/>
+              <a:rPr lang="pt-BR"/>
               <a:t>Clique para editar o texto mestre</a:t>
             </a:r>
           </a:p>
           <a:p>
             <a:pPr lvl="1"/>
             <a:r>
-              <a:rPr lang="pt-BR" smtClean="0"/>
+              <a:rPr lang="pt-BR"/>
               <a:t>Segundo nível</a:t>
             </a:r>
           </a:p>
           <a:p>
             <a:pPr lvl="2"/>
             <a:r>
-              <a:rPr lang="pt-BR" smtClean="0"/>
+              <a:rPr lang="pt-BR"/>
               <a:t>Terceiro nível</a:t>
             </a:r>
           </a:p>
           <a:p>
             <a:pPr lvl="3"/>
             <a:r>
-              <a:rPr lang="pt-BR" smtClean="0"/>
+              <a:rPr lang="pt-BR"/>
               <a:t>Quarto nível</a:t>
             </a:r>
           </a:p>
           <a:p>
             <a:pPr lvl="4"/>
             <a:r>
-              <a:rPr lang="pt-BR" smtClean="0"/>
+              <a:rPr lang="pt-BR"/>
               <a:t>Quinto nível</a:t>
             </a:r>
             <a:endParaRPr lang="en-US" dirty="0"/>
@@ -2790,7 +2789,7 @@
           <a:p>
             <a:pPr lvl="0"/>
             <a:r>
-              <a:rPr lang="pt-BR" smtClean="0"/>
+              <a:rPr lang="pt-BR"/>
               <a:t>Clique para editar o texto mestre</a:t>
             </a:r>
           </a:p>
@@ -2813,7 +2812,7 @@
           <a:p>
             <a:fld id="{F72AEF3B-AD3D-4C07-B255-57037BF73F56}" type="datetimeFigureOut">
               <a:rPr lang="pt-BR" smtClean="0"/>
-              <a:t>02/01/2021</a:t>
+              <a:t>16/02/2021</a:t>
             </a:fld>
             <a:endParaRPr lang="pt-BR" dirty="0"/>
           </a:p>
@@ -2916,7 +2915,7 @@
           </a:lstStyle>
           <a:p>
             <a:r>
-              <a:rPr lang="pt-BR" smtClean="0"/>
+              <a:rPr lang="pt-BR"/>
               <a:t>Clique para editar o título mestre</a:t>
             </a:r>
             <a:endParaRPr lang="en-US" dirty="0"/>
@@ -2981,7 +2980,7 @@
           </a:lstStyle>
           <a:p>
             <a:r>
-              <a:rPr lang="pt-BR" dirty="0" smtClean="0"/>
+              <a:rPr lang="pt-BR" dirty="0"/>
               <a:t>Clique no ícone para adicionar uma imagem</a:t>
             </a:r>
             <a:endParaRPr lang="en-US" dirty="0"/>
@@ -3047,7 +3046,7 @@
           <a:p>
             <a:pPr lvl="0"/>
             <a:r>
-              <a:rPr lang="pt-BR" smtClean="0"/>
+              <a:rPr lang="pt-BR"/>
               <a:t>Clique para editar o texto mestre</a:t>
             </a:r>
           </a:p>
@@ -3070,7 +3069,7 @@
           <a:p>
             <a:fld id="{F72AEF3B-AD3D-4C07-B255-57037BF73F56}" type="datetimeFigureOut">
               <a:rPr lang="pt-BR" smtClean="0"/>
-              <a:t>02/01/2021</a:t>
+              <a:t>16/02/2021</a:t>
             </a:fld>
             <a:endParaRPr lang="pt-BR" dirty="0"/>
           </a:p>
@@ -3179,7 +3178,7 @@
           <a:lstStyle/>
           <a:p>
             <a:r>
-              <a:rPr lang="pt-BR" smtClean="0"/>
+              <a:rPr lang="pt-BR"/>
               <a:t>Clique para editar o título mestre</a:t>
             </a:r>
             <a:endParaRPr lang="en-US" dirty="0"/>
@@ -3213,35 +3212,35 @@
           <a:p>
             <a:pPr lvl="0"/>
             <a:r>
-              <a:rPr lang="pt-BR" smtClean="0"/>
+              <a:rPr lang="pt-BR"/>
               <a:t>Clique para editar o texto mestre</a:t>
             </a:r>
           </a:p>
           <a:p>
             <a:pPr lvl="1"/>
             <a:r>
-              <a:rPr lang="pt-BR" smtClean="0"/>
+              <a:rPr lang="pt-BR"/>
               <a:t>Segundo nível</a:t>
             </a:r>
           </a:p>
           <a:p>
             <a:pPr lvl="2"/>
             <a:r>
-              <a:rPr lang="pt-BR" smtClean="0"/>
+              <a:rPr lang="pt-BR"/>
               <a:t>Terceiro nível</a:t>
             </a:r>
           </a:p>
           <a:p>
             <a:pPr lvl="3"/>
             <a:r>
-              <a:rPr lang="pt-BR" smtClean="0"/>
+              <a:rPr lang="pt-BR"/>
               <a:t>Quarto nível</a:t>
             </a:r>
           </a:p>
           <a:p>
             <a:pPr lvl="4"/>
             <a:r>
-              <a:rPr lang="pt-BR" smtClean="0"/>
+              <a:rPr lang="pt-BR"/>
               <a:t>Quinto nível</a:t>
             </a:r>
             <a:endParaRPr lang="en-US" dirty="0"/>
@@ -3283,7 +3282,7 @@
           <a:p>
             <a:fld id="{F72AEF3B-AD3D-4C07-B255-57037BF73F56}" type="datetimeFigureOut">
               <a:rPr lang="pt-BR" smtClean="0"/>
-              <a:t>02/01/2021</a:t>
+              <a:t>16/02/2021</a:t>
             </a:fld>
             <a:endParaRPr lang="pt-BR" dirty="0"/>
           </a:p>
@@ -3733,7 +3732,7 @@
           <a:lstStyle/>
           <a:p>
             <a:r>
-              <a:rPr lang="pt-PT" sz="9600" dirty="0" smtClean="0">
+              <a:rPr lang="pt-PT" sz="9600" dirty="0">
                 <a:solidFill>
                   <a:schemeClr val="bg1"/>
                 </a:solidFill>
@@ -3780,6 +3779,24 @@
                 </a:solidFill>
               </a:rPr>
               <a:t>Aula 05 – Comandos básicos do terminal</a:t>
+            </a:r>
+          </a:p>
+          <a:p>
+            <a:r>
+              <a:rPr lang="pt-PT" dirty="0">
+                <a:solidFill>
+                  <a:schemeClr val="bg1"/>
+                </a:solidFill>
+              </a:rPr>
+              <a:t>(</a:t>
+            </a:r>
+            <a:r>
+              <a:rPr lang="pt-PT">
+                <a:solidFill>
+                  <a:schemeClr val="bg1"/>
+                </a:solidFill>
+              </a:rPr>
+              <a:t>parte 01 &amp; 02)</a:t>
             </a:r>
             <a:endParaRPr lang="pt-BR" dirty="0">
               <a:solidFill>
@@ -3895,13 +3912,6 @@
       </p:transition>
     </mc:Fallback>
   </mc:AlternateContent>
-  <p:timing>
-    <p:tnLst>
-      <p:par>
-        <p:cTn id="1" dur="indefinite" restart="never" nodeType="tmRoot"/>
-      </p:par>
-    </p:tnLst>
-  </p:timing>
 </p:sld>
 </file>
 
@@ -3938,7 +3948,7 @@
           <a:lstStyle/>
           <a:p>
             <a:r>
-              <a:rPr lang="pt-PT" dirty="0" smtClean="0"/>
+              <a:rPr lang="pt-PT" dirty="0"/>
               <a:t>Listagem de directórios</a:t>
             </a:r>
             <a:endParaRPr lang="pt-BR" dirty="0"/>
@@ -3962,66 +3972,66 @@
           <a:p>
             <a:pPr algn="just"/>
             <a:r>
-              <a:rPr lang="pt-BR" dirty="0" err="1" smtClean="0"/>
+              <a:rPr lang="pt-BR" dirty="0" err="1"/>
               <a:t>ls</a:t>
             </a:r>
             <a:r>
-              <a:rPr lang="pt-BR" dirty="0" smtClean="0"/>
+              <a:rPr lang="pt-BR" dirty="0"/>
               <a:t> =&gt; é o comando usado para listagem dos </a:t>
             </a:r>
             <a:r>
-              <a:rPr lang="pt-BR" dirty="0" err="1" smtClean="0"/>
+              <a:rPr lang="pt-BR" dirty="0" err="1"/>
               <a:t>sub-directórios</a:t>
             </a:r>
             <a:r>
-              <a:rPr lang="pt-BR" dirty="0" smtClean="0"/>
+              <a:rPr lang="pt-BR" dirty="0"/>
               <a:t> e arquivos de um </a:t>
             </a:r>
             <a:r>
-              <a:rPr lang="pt-BR" dirty="0" err="1" smtClean="0"/>
+              <a:rPr lang="pt-BR" dirty="0" err="1"/>
               <a:t>directório</a:t>
             </a:r>
             <a:r>
-              <a:rPr lang="pt-BR" dirty="0" smtClean="0"/>
+              <a:rPr lang="pt-BR" dirty="0"/>
               <a:t>. Aceita parâmetros como:</a:t>
             </a:r>
           </a:p>
           <a:p>
             <a:pPr lvl="1" algn="just"/>
             <a:r>
-              <a:rPr lang="pt-BR" dirty="0" smtClean="0"/>
+              <a:rPr lang="pt-BR" dirty="0"/>
               <a:t>-l</a:t>
             </a:r>
           </a:p>
           <a:p>
             <a:pPr lvl="1" algn="just"/>
             <a:r>
-              <a:rPr lang="pt-BR" dirty="0" smtClean="0"/>
+              <a:rPr lang="pt-BR" dirty="0"/>
               <a:t>-a</a:t>
             </a:r>
           </a:p>
           <a:p>
             <a:pPr lvl="1" algn="just"/>
             <a:r>
-              <a:rPr lang="pt-BR" dirty="0" smtClean="0"/>
+              <a:rPr lang="pt-BR" dirty="0"/>
               <a:t>-</a:t>
             </a:r>
             <a:r>
-              <a:rPr lang="pt-BR" dirty="0" err="1" smtClean="0"/>
+              <a:rPr lang="pt-BR" dirty="0" err="1"/>
               <a:t>la</a:t>
             </a:r>
-            <a:endParaRPr lang="pt-BR" dirty="0" smtClean="0"/>
+            <a:endParaRPr lang="pt-BR" dirty="0"/>
           </a:p>
           <a:p>
             <a:pPr lvl="1" algn="just"/>
             <a:r>
-              <a:rPr lang="pt-BR" dirty="0" smtClean="0"/>
+              <a:rPr lang="pt-BR" dirty="0"/>
               <a:t>-al</a:t>
             </a:r>
           </a:p>
           <a:p>
             <a:pPr algn="just"/>
-            <a:endParaRPr lang="pt-PT" dirty="0" smtClean="0"/>
+            <a:endParaRPr lang="pt-PT" dirty="0"/>
           </a:p>
         </p:txBody>
       </p:sp>
@@ -4631,11 +4641,11 @@
           <a:lstStyle/>
           <a:p>
             <a:r>
-              <a:rPr lang="pt-BR" dirty="0" smtClean="0"/>
+              <a:rPr lang="pt-BR" dirty="0"/>
               <a:t>Mudança de </a:t>
             </a:r>
             <a:r>
-              <a:rPr lang="pt-BR" dirty="0" err="1" smtClean="0"/>
+              <a:rPr lang="pt-BR" dirty="0" err="1"/>
               <a:t>directório</a:t>
             </a:r>
             <a:endParaRPr lang="pt-PT" dirty="0"/>
@@ -4658,78 +4668,78 @@
           <a:lstStyle/>
           <a:p>
             <a:r>
-              <a:rPr lang="pt-BR" dirty="0" err="1" smtClean="0"/>
+              <a:rPr lang="pt-BR" dirty="0" err="1"/>
               <a:t>cd</a:t>
             </a:r>
             <a:r>
-              <a:rPr lang="pt-BR" dirty="0" smtClean="0"/>
+              <a:rPr lang="pt-BR" dirty="0"/>
               <a:t> (</a:t>
             </a:r>
             <a:r>
-              <a:rPr lang="pt-BR" dirty="0" err="1" smtClean="0"/>
+              <a:rPr lang="pt-BR" dirty="0" err="1"/>
               <a:t>change</a:t>
             </a:r>
             <a:r>
-              <a:rPr lang="pt-BR" dirty="0" smtClean="0"/>
+              <a:rPr lang="pt-BR" dirty="0"/>
               <a:t> </a:t>
             </a:r>
             <a:r>
-              <a:rPr lang="pt-BR" dirty="0" err="1" smtClean="0"/>
+              <a:rPr lang="pt-BR" dirty="0" err="1"/>
               <a:t>directory</a:t>
             </a:r>
             <a:r>
-              <a:rPr lang="pt-BR" dirty="0" smtClean="0"/>
+              <a:rPr lang="pt-BR" dirty="0"/>
               <a:t>) =&gt; este comando permite que eu saia de um </a:t>
             </a:r>
             <a:r>
-              <a:rPr lang="pt-BR" dirty="0" err="1" smtClean="0"/>
+              <a:rPr lang="pt-BR" dirty="0" err="1"/>
               <a:t>directório</a:t>
             </a:r>
             <a:r>
-              <a:rPr lang="pt-BR" dirty="0" smtClean="0"/>
+              <a:rPr lang="pt-BR" dirty="0"/>
               <a:t> para outro. Recebe parâmetros como:</a:t>
             </a:r>
           </a:p>
           <a:p>
             <a:pPr lvl="1"/>
             <a:r>
-              <a:rPr lang="pt-BR" dirty="0" err="1" smtClean="0"/>
+              <a:rPr lang="pt-BR" dirty="0" err="1"/>
               <a:t>Directório</a:t>
             </a:r>
-            <a:endParaRPr lang="pt-BR" dirty="0" smtClean="0"/>
+            <a:endParaRPr lang="pt-BR" dirty="0"/>
           </a:p>
           <a:p>
             <a:pPr lvl="1"/>
             <a:r>
-              <a:rPr lang="pt-BR" dirty="0" smtClean="0"/>
+              <a:rPr lang="pt-BR" dirty="0"/>
               <a:t>..</a:t>
             </a:r>
           </a:p>
           <a:p>
             <a:pPr lvl="1"/>
             <a:r>
-              <a:rPr lang="pt-BR" dirty="0" smtClean="0"/>
+              <a:rPr lang="pt-BR" dirty="0"/>
               <a:t>../..</a:t>
             </a:r>
           </a:p>
           <a:p>
             <a:pPr lvl="1"/>
             <a:r>
-              <a:rPr lang="pt-BR" dirty="0" smtClean="0"/>
+              <a:rPr lang="pt-BR" dirty="0"/>
               <a:t>~</a:t>
             </a:r>
           </a:p>
           <a:p>
             <a:pPr lvl="1"/>
             <a:r>
-              <a:rPr lang="pt-BR" dirty="0" smtClean="0"/>
+              <a:rPr lang="pt-BR" dirty="0"/>
               <a:t>#</a:t>
             </a:r>
           </a:p>
           <a:p>
             <a:pPr lvl="1"/>
             <a:r>
-              <a:rPr lang="pt-BR" dirty="0" smtClean="0"/>
+              <a:rPr lang="pt-BR" dirty="0"/>
               <a:t>Vazio</a:t>
             </a:r>
           </a:p>
@@ -5551,15 +5561,15 @@
           <a:lstStyle/>
           <a:p>
             <a:r>
-              <a:rPr lang="pt-BR" dirty="0" smtClean="0"/>
+              <a:rPr lang="pt-BR" dirty="0"/>
               <a:t>Gerenciamento de </a:t>
             </a:r>
             <a:r>
-              <a:rPr lang="pt-BR" dirty="0" err="1" smtClean="0"/>
+              <a:rPr lang="pt-BR" dirty="0" err="1"/>
               <a:t>directórios</a:t>
             </a:r>
             <a:r>
-              <a:rPr lang="pt-BR" dirty="0" smtClean="0"/>
+              <a:rPr lang="pt-BR" dirty="0"/>
               <a:t> e arquivos</a:t>
             </a:r>
             <a:endParaRPr lang="pt-PT" dirty="0"/>
@@ -5583,142 +5593,138 @@
           <a:p>
             <a:r>
               <a:rPr lang="pt-BR" dirty="0" err="1"/>
-              <a:t>m</a:t>
-            </a:r>
-            <a:r>
-              <a:rPr lang="pt-BR" dirty="0" err="1" smtClean="0"/>
-              <a:t>kdir</a:t>
-            </a:r>
-            <a:r>
-              <a:rPr lang="pt-BR" dirty="0" smtClean="0"/>
+              <a:t>mkdir</a:t>
+            </a:r>
+            <a:r>
+              <a:rPr lang="pt-BR" dirty="0"/>
               <a:t> (</a:t>
             </a:r>
             <a:r>
-              <a:rPr lang="pt-BR" dirty="0" err="1" smtClean="0"/>
+              <a:rPr lang="pt-BR" dirty="0" err="1"/>
               <a:t>make</a:t>
             </a:r>
             <a:r>
-              <a:rPr lang="pt-BR" dirty="0" smtClean="0"/>
+              <a:rPr lang="pt-BR" dirty="0"/>
               <a:t> </a:t>
             </a:r>
             <a:r>
-              <a:rPr lang="pt-BR" dirty="0" err="1" smtClean="0"/>
+              <a:rPr lang="pt-BR" dirty="0" err="1"/>
               <a:t>directory</a:t>
             </a:r>
             <a:r>
-              <a:rPr lang="pt-BR" dirty="0" smtClean="0"/>
+              <a:rPr lang="pt-BR" dirty="0"/>
               <a:t>) =&gt; cria um novo </a:t>
             </a:r>
             <a:r>
-              <a:rPr lang="pt-BR" dirty="0" err="1" smtClean="0"/>
+              <a:rPr lang="pt-BR" dirty="0" err="1"/>
               <a:t>directório</a:t>
             </a:r>
             <a:r>
-              <a:rPr lang="pt-BR" dirty="0" smtClean="0"/>
+              <a:rPr lang="pt-BR" dirty="0"/>
               <a:t>.</a:t>
             </a:r>
           </a:p>
           <a:p>
             <a:r>
-              <a:rPr lang="pt-BR" dirty="0" err="1" smtClean="0"/>
+              <a:rPr lang="pt-BR" dirty="0" err="1"/>
               <a:t>rmdir</a:t>
             </a:r>
             <a:r>
-              <a:rPr lang="pt-BR" dirty="0" smtClean="0"/>
+              <a:rPr lang="pt-BR" dirty="0"/>
               <a:t> (remove </a:t>
             </a:r>
             <a:r>
-              <a:rPr lang="pt-BR" dirty="0" err="1" smtClean="0"/>
+              <a:rPr lang="pt-BR" dirty="0" err="1"/>
               <a:t>directory</a:t>
             </a:r>
             <a:r>
-              <a:rPr lang="pt-BR" dirty="0" smtClean="0"/>
+              <a:rPr lang="pt-BR" dirty="0"/>
               <a:t>) =&gt; apaga um </a:t>
             </a:r>
             <a:r>
-              <a:rPr lang="pt-BR" dirty="0" err="1" smtClean="0"/>
+              <a:rPr lang="pt-BR" dirty="0" err="1"/>
               <a:t>directório</a:t>
             </a:r>
-            <a:endParaRPr lang="pt-BR" dirty="0" smtClean="0"/>
-          </a:p>
-          <a:p>
-            <a:r>
-              <a:rPr lang="pt-BR" dirty="0" err="1" smtClean="0"/>
+            <a:endParaRPr lang="pt-BR" dirty="0"/>
+          </a:p>
+          <a:p>
+            <a:r>
+              <a:rPr lang="pt-BR" dirty="0" err="1"/>
               <a:t>rm</a:t>
             </a:r>
             <a:r>
-              <a:rPr lang="pt-BR" dirty="0" smtClean="0"/>
+              <a:rPr lang="pt-BR" dirty="0"/>
               <a:t> (remove) =&gt; apaga um </a:t>
             </a:r>
             <a:r>
-              <a:rPr lang="pt-BR" dirty="0" err="1" smtClean="0"/>
+              <a:rPr lang="pt-BR" dirty="0" err="1"/>
               <a:t>directório</a:t>
             </a:r>
             <a:r>
-              <a:rPr lang="pt-BR" dirty="0" smtClean="0"/>
+              <a:rPr lang="pt-BR" dirty="0"/>
               <a:t> ou ficheiro.</a:t>
             </a:r>
           </a:p>
           <a:p>
             <a:r>
-              <a:rPr lang="pt-BR" dirty="0" err="1" smtClean="0"/>
+              <a:rPr lang="pt-BR" dirty="0" err="1"/>
               <a:t>cp</a:t>
             </a:r>
             <a:r>
-              <a:rPr lang="pt-BR" dirty="0" smtClean="0"/>
+              <a:rPr lang="pt-BR" dirty="0"/>
               <a:t> (</a:t>
             </a:r>
             <a:r>
-              <a:rPr lang="pt-BR" dirty="0" err="1" smtClean="0"/>
+              <a:rPr lang="pt-BR" dirty="0" err="1"/>
               <a:t>copy</a:t>
             </a:r>
             <a:r>
-              <a:rPr lang="pt-BR" dirty="0" smtClean="0"/>
+              <a:rPr lang="pt-BR" dirty="0"/>
               <a:t>) =&gt; copia um </a:t>
             </a:r>
             <a:r>
-              <a:rPr lang="pt-BR" dirty="0" err="1" smtClean="0"/>
+              <a:rPr lang="pt-BR" dirty="0" err="1"/>
               <a:t>directório</a:t>
             </a:r>
             <a:r>
-              <a:rPr lang="pt-BR" dirty="0" smtClean="0"/>
+              <a:rPr lang="pt-BR" dirty="0"/>
               <a:t> ou ficheiro.</a:t>
             </a:r>
           </a:p>
           <a:p>
             <a:r>
-              <a:rPr lang="pt-BR" dirty="0" err="1" smtClean="0"/>
+              <a:rPr lang="pt-BR" dirty="0" err="1"/>
               <a:t>touch</a:t>
             </a:r>
             <a:r>
-              <a:rPr lang="pt-BR" dirty="0" smtClean="0"/>
+              <a:rPr lang="pt-BR" dirty="0"/>
               <a:t> =&gt; cria um novo ficheiro.</a:t>
             </a:r>
           </a:p>
           <a:p>
             <a:r>
-              <a:rPr lang="pt-BR" dirty="0" err="1" smtClean="0"/>
+              <a:rPr lang="pt-BR" dirty="0" err="1"/>
               <a:t>cat</a:t>
             </a:r>
             <a:r>
-              <a:rPr lang="pt-BR" dirty="0" smtClean="0"/>
+              <a:rPr lang="pt-BR" dirty="0"/>
               <a:t> =&gt; ver o conteúdo de um ficheiro.</a:t>
             </a:r>
           </a:p>
           <a:p>
             <a:r>
-              <a:rPr lang="pt-BR" dirty="0" smtClean="0"/>
+              <a:rPr lang="pt-BR" dirty="0"/>
               <a:t>nano =&gt; abre um editor de texto no terminal.</a:t>
             </a:r>
           </a:p>
           <a:p>
             <a:r>
-              <a:rPr lang="pt-PT" dirty="0" smtClean="0"/>
+              <a:rPr lang="pt-PT" dirty="0"/>
               <a:t>mv =&gt; move um directório ou ficheiro.</a:t>
             </a:r>
           </a:p>
           <a:p>
-            <a:endParaRPr lang="pt-PT" dirty="0" smtClean="0"/>
+            <a:endParaRPr lang="pt-PT" dirty="0"/>
           </a:p>
         </p:txBody>
       </p:sp>
@@ -6637,10 +6643,9 @@
           <a:lstStyle/>
           <a:p>
             <a:r>
-              <a:rPr lang="pt-PT" dirty="0" smtClean="0"/>
+              <a:rPr lang="pt-PT" dirty="0"/>
               <a:t>Outros</a:t>
             </a:r>
-            <a:endParaRPr lang="pt-PT" dirty="0"/>
           </a:p>
         </p:txBody>
       </p:sp>
@@ -6660,30 +6665,21 @@
           <a:lstStyle/>
           <a:p>
             <a:r>
-              <a:rPr lang="pt-PT" dirty="0" smtClean="0"/>
+              <a:rPr lang="pt-PT" dirty="0"/>
               <a:t>clear/cls =&gt; Limpa a tela do terminal</a:t>
             </a:r>
           </a:p>
           <a:p>
             <a:r>
               <a:rPr lang="pt-PT" dirty="0"/>
-              <a:t>h</a:t>
-            </a:r>
-            <a:r>
-              <a:rPr lang="pt-PT" dirty="0" smtClean="0"/>
-              <a:t>elp =&gt; abre um conjunto de explicações de como usar certos comandos</a:t>
+              <a:t>help =&gt; abre um conjunto de explicações de como usar certos comandos</a:t>
             </a:r>
           </a:p>
           <a:p>
             <a:r>
               <a:rPr lang="pt-PT" dirty="0"/>
-              <a:t>e</a:t>
-            </a:r>
-            <a:r>
-              <a:rPr lang="pt-PT" dirty="0" smtClean="0"/>
-              <a:t>xit =&gt; encerra o terminal</a:t>
-            </a:r>
-            <a:endParaRPr lang="pt-PT" dirty="0"/>
+              <a:t>exit =&gt; encerra o terminal</a:t>
+            </a:r>
           </a:p>
         </p:txBody>
       </p:sp>
@@ -7116,7 +7112,7 @@
           <a:lstStyle/>
           <a:p>
             <a:r>
-              <a:rPr lang="pt-PT" sz="9600" dirty="0" smtClean="0">
+              <a:rPr lang="pt-PT" sz="9600" dirty="0">
                 <a:solidFill>
                   <a:schemeClr val="bg1"/>
                 </a:solidFill>
@@ -7147,7 +7143,7 @@
           <a:lstStyle/>
           <a:p>
             <a:r>
-              <a:rPr lang="pt-PT" dirty="0" smtClean="0">
+              <a:rPr lang="pt-PT" dirty="0">
                 <a:solidFill>
                   <a:schemeClr val="bg1"/>
                 </a:solidFill>
@@ -7268,13 +7264,6 @@
       </p:transition>
     </mc:Fallback>
   </mc:AlternateContent>
-  <p:timing>
-    <p:tnLst>
-      <p:par>
-        <p:cTn id="1" dur="indefinite" restart="never" nodeType="tmRoot"/>
-      </p:par>
-    </p:tnLst>
-  </p:timing>
 </p:sld>
 </file>
 

</xml_diff>